<commit_message>
Finsihed shot_004-10 and -11
</commit_message>
<xml_diff>
--- a/shot_004/summary.pptx
+++ b/shot_004/summary.pptx
@@ -12,6 +12,7 @@
     <p:sldId id="259" r:id="rId6"/>
     <p:sldId id="258" r:id="rId7"/>
     <p:sldId id="257" r:id="rId8"/>
+    <p:sldId id="263" r:id="rId9"/>
   </p:sldIdLst>
   <p:sldSz cx="12192000" cy="6858000"/>
   <p:notesSz cx="6858000" cy="9144000"/>
@@ -3040,6 +3041,13 @@
   <p:clrMapOvr>
     <a:masterClrMapping/>
   </p:clrMapOvr>
+  <p:timing>
+    <p:tnLst>
+      <p:par>
+        <p:cTn id="1" dur="indefinite" restart="never" nodeType="tmRoot"/>
+      </p:par>
+    </p:tnLst>
+  </p:timing>
 </p:sld>
 </file>
 
@@ -3130,6 +3138,13 @@
   <p:clrMapOvr>
     <a:masterClrMapping/>
   </p:clrMapOvr>
+  <p:timing>
+    <p:tnLst>
+      <p:par>
+        <p:cTn id="1" dur="indefinite" restart="never" nodeType="tmRoot"/>
+      </p:par>
+    </p:tnLst>
+  </p:timing>
 </p:sld>
 </file>
 
@@ -3220,6 +3235,13 @@
   <p:clrMapOvr>
     <a:masterClrMapping/>
   </p:clrMapOvr>
+  <p:timing>
+    <p:tnLst>
+      <p:par>
+        <p:cTn id="1" dur="indefinite" restart="never" nodeType="tmRoot"/>
+      </p:par>
+    </p:tnLst>
+  </p:timing>
 </p:sld>
 </file>
 
@@ -3310,6 +3332,13 @@
   <p:clrMapOvr>
     <a:masterClrMapping/>
   </p:clrMapOvr>
+  <p:timing>
+    <p:tnLst>
+      <p:par>
+        <p:cTn id="1" dur="indefinite" restart="never" nodeType="tmRoot"/>
+      </p:par>
+    </p:tnLst>
+  </p:timing>
 </p:sld>
 </file>
 
@@ -3400,6 +3429,13 @@
   <p:clrMapOvr>
     <a:masterClrMapping/>
   </p:clrMapOvr>
+  <p:timing>
+    <p:tnLst>
+      <p:par>
+        <p:cTn id="1" dur="indefinite" restart="never" nodeType="tmRoot"/>
+      </p:par>
+    </p:tnLst>
+  </p:timing>
 </p:sld>
 </file>
 
@@ -3490,6 +3526,13 @@
   <p:clrMapOvr>
     <a:masterClrMapping/>
   </p:clrMapOvr>
+  <p:timing>
+    <p:tnLst>
+      <p:par>
+        <p:cTn id="1" dur="indefinite" restart="never" nodeType="tmRoot"/>
+      </p:par>
+    </p:tnLst>
+  </p:timing>
 </p:sld>
 </file>
 
@@ -3580,6 +3623,110 @@
   <p:clrMapOvr>
     <a:masterClrMapping/>
   </p:clrMapOvr>
+  <p:timing>
+    <p:tnLst>
+      <p:par>
+        <p:cTn id="1" dur="indefinite" restart="never" nodeType="tmRoot"/>
+      </p:par>
+    </p:tnLst>
+  </p:timing>
+</p:sld>
+</file>
+
+<file path=ppt/slides/slide8.xml><?xml version="1.0" encoding="utf-8"?>
+<p:sld xmlns:a="http://schemas.openxmlformats.org/drawingml/2006/main" xmlns:r="http://schemas.openxmlformats.org/officeDocument/2006/relationships" xmlns:p="http://schemas.openxmlformats.org/presentationml/2006/main">
+  <p:cSld>
+    <p:spTree>
+      <p:nvGrpSpPr>
+        <p:cNvPr id="1" name=""/>
+        <p:cNvGrpSpPr/>
+        <p:nvPr/>
+      </p:nvGrpSpPr>
+      <p:grpSpPr>
+        <a:xfrm>
+          <a:off x="0" y="0"/>
+          <a:ext cx="0" cy="0"/>
+          <a:chOff x="0" y="0"/>
+          <a:chExt cx="0" cy="0"/>
+        </a:xfrm>
+      </p:grpSpPr>
+      <p:pic>
+        <p:nvPicPr>
+          <p:cNvPr id="2" name="Picture 1"/>
+          <p:cNvPicPr>
+            <a:picLocks noChangeAspect="1"/>
+          </p:cNvPicPr>
+          <p:nvPr/>
+        </p:nvPicPr>
+        <p:blipFill>
+          <a:blip r:embed="rId2">
+            <a:extLst>
+              <a:ext uri="{28A0092B-C50C-407E-A947-70E740481C1C}">
+                <a14:useLocalDpi xmlns:a14="http://schemas.microsoft.com/office/drawing/2010/main" val="0"/>
+              </a:ext>
+            </a:extLst>
+          </a:blip>
+          <a:stretch>
+            <a:fillRect/>
+          </a:stretch>
+        </p:blipFill>
+        <p:spPr>
+          <a:xfrm>
+            <a:off x="0" y="0"/>
+            <a:ext cx="5943600" cy="5330309"/>
+          </a:xfrm>
+          <a:prstGeom prst="rect">
+            <a:avLst/>
+          </a:prstGeom>
+        </p:spPr>
+      </p:pic>
+      <p:pic>
+        <p:nvPicPr>
+          <p:cNvPr id="3" name="Picture 2"/>
+          <p:cNvPicPr>
+            <a:picLocks noChangeAspect="1"/>
+          </p:cNvPicPr>
+          <p:nvPr/>
+        </p:nvPicPr>
+        <p:blipFill>
+          <a:blip r:embed="rId3">
+            <a:extLst>
+              <a:ext uri="{28A0092B-C50C-407E-A947-70E740481C1C}">
+                <a14:useLocalDpi xmlns:a14="http://schemas.microsoft.com/office/drawing/2010/main" val="0"/>
+              </a:ext>
+            </a:extLst>
+          </a:blip>
+          <a:stretch>
+            <a:fillRect/>
+          </a:stretch>
+        </p:blipFill>
+        <p:spPr>
+          <a:xfrm>
+            <a:off x="5943600" y="0"/>
+            <a:ext cx="5943600" cy="5330309"/>
+          </a:xfrm>
+          <a:prstGeom prst="rect">
+            <a:avLst/>
+          </a:prstGeom>
+        </p:spPr>
+      </p:pic>
+    </p:spTree>
+    <p:extLst>
+      <p:ext uri="{BB962C8B-B14F-4D97-AF65-F5344CB8AC3E}">
+        <p14:creationId xmlns:p14="http://schemas.microsoft.com/office/powerpoint/2010/main" val="349968018"/>
+      </p:ext>
+    </p:extLst>
+  </p:cSld>
+  <p:clrMapOvr>
+    <a:masterClrMapping/>
+  </p:clrMapOvr>
+  <p:timing>
+    <p:tnLst>
+      <p:par>
+        <p:cTn id="1" dur="indefinite" restart="never" nodeType="tmRoot"/>
+      </p:par>
+    </p:tnLst>
+  </p:timing>
 </p:sld>
 </file>
 

</xml_diff>